<commit_message>
A templated (crappy) smart array
</commit_message>
<xml_diff>
--- a/Week 3 (Sept. 22nd)/Templates.pptx
+++ b/Week 3 (Sept. 22nd)/Templates.pptx
@@ -18,15 +18,16 @@
     <p:sldId id="271" r:id="rId12"/>
     <p:sldId id="272" r:id="rId13"/>
     <p:sldId id="273" r:id="rId14"/>
-    <p:sldId id="274" r:id="rId15"/>
-    <p:sldId id="299" r:id="rId16"/>
-    <p:sldId id="259" r:id="rId17"/>
-    <p:sldId id="260" r:id="rId18"/>
-    <p:sldId id="261" r:id="rId19"/>
-    <p:sldId id="262" r:id="rId20"/>
-    <p:sldId id="263" r:id="rId21"/>
-    <p:sldId id="265" r:id="rId22"/>
-    <p:sldId id="266" r:id="rId23"/>
+    <p:sldId id="305" r:id="rId15"/>
+    <p:sldId id="274" r:id="rId16"/>
+    <p:sldId id="299" r:id="rId17"/>
+    <p:sldId id="259" r:id="rId18"/>
+    <p:sldId id="260" r:id="rId19"/>
+    <p:sldId id="261" r:id="rId20"/>
+    <p:sldId id="262" r:id="rId21"/>
+    <p:sldId id="263" r:id="rId22"/>
+    <p:sldId id="265" r:id="rId23"/>
+    <p:sldId id="266" r:id="rId24"/>
   </p:sldIdLst>
   <p:sldSz cx="12192000" cy="6858000"/>
   <p:notesSz cx="6858000" cy="9144000"/>
@@ -264,7 +265,7 @@
           <a:p>
             <a:fld id="{1E4A8252-26A2-422C-8021-53F2FA7F3083}" type="datetimeFigureOut">
               <a:rPr lang="en-CA" smtClean="0"/>
-              <a:t>2024-10-04</a:t>
+              <a:t>2025-09-22</a:t>
             </a:fld>
             <a:endParaRPr lang="en-CA"/>
           </a:p>
@@ -434,7 +435,7 @@
           <a:p>
             <a:fld id="{1E4A8252-26A2-422C-8021-53F2FA7F3083}" type="datetimeFigureOut">
               <a:rPr lang="en-CA" smtClean="0"/>
-              <a:t>2024-10-04</a:t>
+              <a:t>2025-09-22</a:t>
             </a:fld>
             <a:endParaRPr lang="en-CA"/>
           </a:p>
@@ -614,7 +615,7 @@
           <a:p>
             <a:fld id="{1E4A8252-26A2-422C-8021-53F2FA7F3083}" type="datetimeFigureOut">
               <a:rPr lang="en-CA" smtClean="0"/>
-              <a:t>2024-10-04</a:t>
+              <a:t>2025-09-22</a:t>
             </a:fld>
             <a:endParaRPr lang="en-CA"/>
           </a:p>
@@ -784,7 +785,7 @@
           <a:p>
             <a:fld id="{1E4A8252-26A2-422C-8021-53F2FA7F3083}" type="datetimeFigureOut">
               <a:rPr lang="en-CA" smtClean="0"/>
-              <a:t>2024-10-04</a:t>
+              <a:t>2025-09-22</a:t>
             </a:fld>
             <a:endParaRPr lang="en-CA"/>
           </a:p>
@@ -1030,7 +1031,7 @@
           <a:p>
             <a:fld id="{1E4A8252-26A2-422C-8021-53F2FA7F3083}" type="datetimeFigureOut">
               <a:rPr lang="en-CA" smtClean="0"/>
-              <a:t>2024-10-04</a:t>
+              <a:t>2025-09-22</a:t>
             </a:fld>
             <a:endParaRPr lang="en-CA"/>
           </a:p>
@@ -1262,7 +1263,7 @@
           <a:p>
             <a:fld id="{1E4A8252-26A2-422C-8021-53F2FA7F3083}" type="datetimeFigureOut">
               <a:rPr lang="en-CA" smtClean="0"/>
-              <a:t>2024-10-04</a:t>
+              <a:t>2025-09-22</a:t>
             </a:fld>
             <a:endParaRPr lang="en-CA"/>
           </a:p>
@@ -1629,7 +1630,7 @@
           <a:p>
             <a:fld id="{1E4A8252-26A2-422C-8021-53F2FA7F3083}" type="datetimeFigureOut">
               <a:rPr lang="en-CA" smtClean="0"/>
-              <a:t>2024-10-04</a:t>
+              <a:t>2025-09-22</a:t>
             </a:fld>
             <a:endParaRPr lang="en-CA"/>
           </a:p>
@@ -1747,7 +1748,7 @@
           <a:p>
             <a:fld id="{1E4A8252-26A2-422C-8021-53F2FA7F3083}" type="datetimeFigureOut">
               <a:rPr lang="en-CA" smtClean="0"/>
-              <a:t>2024-10-04</a:t>
+              <a:t>2025-09-22</a:t>
             </a:fld>
             <a:endParaRPr lang="en-CA"/>
           </a:p>
@@ -1842,7 +1843,7 @@
           <a:p>
             <a:fld id="{1E4A8252-26A2-422C-8021-53F2FA7F3083}" type="datetimeFigureOut">
               <a:rPr lang="en-CA" smtClean="0"/>
-              <a:t>2024-10-04</a:t>
+              <a:t>2025-09-22</a:t>
             </a:fld>
             <a:endParaRPr lang="en-CA"/>
           </a:p>
@@ -2119,7 +2120,7 @@
           <a:p>
             <a:fld id="{1E4A8252-26A2-422C-8021-53F2FA7F3083}" type="datetimeFigureOut">
               <a:rPr lang="en-CA" smtClean="0"/>
-              <a:t>2024-10-04</a:t>
+              <a:t>2025-09-22</a:t>
             </a:fld>
             <a:endParaRPr lang="en-CA"/>
           </a:p>
@@ -2372,7 +2373,7 @@
           <a:p>
             <a:fld id="{1E4A8252-26A2-422C-8021-53F2FA7F3083}" type="datetimeFigureOut">
               <a:rPr lang="en-CA" smtClean="0"/>
-              <a:t>2024-10-04</a:t>
+              <a:t>2025-09-22</a:t>
             </a:fld>
             <a:endParaRPr lang="en-CA"/>
           </a:p>
@@ -2594,7 +2595,7 @@
           <a:p>
             <a:fld id="{1E4A8252-26A2-422C-8021-53F2FA7F3083}" type="datetimeFigureOut">
               <a:rPr lang="en-CA" smtClean="0"/>
-              <a:t>2024-10-04</a:t>
+              <a:t>2025-09-22</a:t>
             </a:fld>
             <a:endParaRPr lang="en-CA"/>
           </a:p>
@@ -4379,7 +4380,7 @@
         </p:spPr>
         <p:txBody>
           <a:bodyPr>
-            <a:normAutofit fontScale="90000"/>
+            <a:normAutofit/>
           </a:bodyPr>
           <a:lstStyle/>
           <a:p>
@@ -4389,7 +4390,7 @@
                   <a:schemeClr val="bg1"/>
                 </a:solidFill>
               </a:rPr>
-              <a:t>Class Template with non-generic arguments</a:t>
+              <a:t>Making a templated class…</a:t>
             </a:r>
           </a:p>
         </p:txBody>
@@ -4406,279 +4407,171 @@
         </p:nvSpPr>
         <p:spPr>
           <a:xfrm>
-            <a:off x="168499" y="1290001"/>
-            <a:ext cx="10515600" cy="2758538"/>
+            <a:off x="838200" y="1508943"/>
+            <a:ext cx="10515600" cy="4852100"/>
           </a:xfrm>
         </p:spPr>
         <p:txBody>
           <a:bodyPr>
-            <a:normAutofit fontScale="92500" lnSpcReduction="20000"/>
+            <a:normAutofit lnSpcReduction="10000"/>
           </a:bodyPr>
           <a:lstStyle/>
           <a:p>
             <a:r>
               <a:rPr lang="en-CA" dirty="0"/>
-              <a:t>For a generic class, you may also specify non-type arguments. </a:t>
-            </a:r>
-          </a:p>
-          <a:p>
-            <a:r>
-              <a:rPr lang="en-CA" dirty="0"/>
-              <a:t>You can specify what you would normally think of as a standard argument, such as an integer or a pointer. </a:t>
-            </a:r>
-          </a:p>
-          <a:p>
-            <a:r>
-              <a:rPr lang="en-CA" dirty="0"/>
-              <a:t>The syntax to accomplish this is the same as for normal function parameters: simply include the type and name of the argument.</a:t>
-            </a:r>
-          </a:p>
-          <a:p>
-            <a:r>
-              <a:rPr lang="en-CA" dirty="0"/>
-              <a:t>Declare an object of type </a:t>
-            </a:r>
-            <a:r>
-              <a:rPr lang="en-CA" dirty="0" err="1"/>
-              <a:t>MyClass</a:t>
-            </a:r>
-            <a:r>
-              <a:rPr lang="en-CA" dirty="0"/>
-              <a:t>:</a:t>
-            </a:r>
-          </a:p>
-          <a:p>
-            <a:pPr marL="0" indent="0">
-              <a:buNone/>
-            </a:pPr>
-            <a:r>
-              <a:rPr lang="en-CA" dirty="0"/>
-              <a:t>   </a:t>
-            </a:r>
-            <a:r>
-              <a:rPr lang="en-CA" sz="3200" dirty="0" err="1">
+              <a:t>Ask yourself: “Do I really need to do this?” </a:t>
+            </a:r>
+          </a:p>
+          <a:p>
+            <a:pPr lvl="1"/>
+            <a:r>
+              <a:rPr lang="en-CA" dirty="0">
                 <a:solidFill>
                   <a:schemeClr val="accent5">
                     <a:lumMod val="75000"/>
                   </a:schemeClr>
                 </a:solidFill>
               </a:rPr>
-              <a:t>MyClass</a:t>
-            </a:r>
-            <a:r>
-              <a:rPr lang="en-CA" sz="3200" dirty="0">
+              <a:t>Because you almost always DON’T</a:t>
+            </a:r>
+          </a:p>
+          <a:p>
+            <a:r>
+              <a:rPr lang="en-CA" dirty="0">
                 <a:solidFill>
                   <a:schemeClr val="accent5">
                     <a:lumMod val="75000"/>
                   </a:schemeClr>
                 </a:solidFill>
               </a:rPr>
-              <a:t> &lt;int, 10&gt; </a:t>
-            </a:r>
-            <a:r>
-              <a:rPr lang="en-CA" sz="3200" dirty="0" err="1">
+              <a:t>Make the class the “usual” way with the specific type:</a:t>
+            </a:r>
+          </a:p>
+          <a:p>
+            <a:pPr lvl="1"/>
+            <a:r>
+              <a:rPr lang="en-CA" dirty="0">
                 <a:solidFill>
                   <a:schemeClr val="accent5">
                     <a:lumMod val="75000"/>
                   </a:schemeClr>
                 </a:solidFill>
               </a:rPr>
-              <a:t>intFoo</a:t>
-            </a:r>
-            <a:r>
-              <a:rPr lang="en-CA" sz="3200" dirty="0">
+              <a:t>Definitions in the header</a:t>
+            </a:r>
+          </a:p>
+          <a:p>
+            <a:pPr lvl="1"/>
+            <a:r>
+              <a:rPr lang="en-CA" dirty="0">
                 <a:solidFill>
                   <a:schemeClr val="accent5">
                     <a:lumMod val="75000"/>
                   </a:schemeClr>
                 </a:solidFill>
               </a:rPr>
-              <a:t>;</a:t>
-            </a:r>
-          </a:p>
-        </p:txBody>
-      </p:sp>
-      <p:sp>
-        <p:nvSpPr>
-          <p:cNvPr id="5" name="TextBox 4"/>
-          <p:cNvSpPr txBox="1"/>
-          <p:nvPr/>
-        </p:nvSpPr>
-        <p:spPr>
-          <a:xfrm>
-            <a:off x="5305331" y="3130500"/>
-            <a:ext cx="6651443" cy="3477875"/>
-          </a:xfrm>
-          <a:prstGeom prst="rect">
-            <a:avLst/>
-          </a:prstGeom>
-          <a:noFill/>
-          <a:ln>
-            <a:solidFill>
-              <a:schemeClr val="accent1"/>
-            </a:solidFill>
-          </a:ln>
-        </p:spPr>
-        <p:txBody>
-          <a:bodyPr wrap="square" rtlCol="0">
-            <a:spAutoFit/>
-          </a:bodyPr>
-          <a:lstStyle/>
-          <a:p>
-            <a:r>
-              <a:rPr lang="en-CA" sz="2200" dirty="0">
+              <a:t>Implementation (code) in the .</a:t>
+            </a:r>
+            <a:r>
+              <a:rPr lang="en-CA" dirty="0" err="1">
                 <a:solidFill>
                   <a:schemeClr val="accent5">
                     <a:lumMod val="75000"/>
                   </a:schemeClr>
                 </a:solidFill>
               </a:rPr>
-              <a:t>// Here, int size is a non-type argument.</a:t>
-            </a:r>
-          </a:p>
-          <a:p>
-            <a:r>
-              <a:rPr lang="en-CA" sz="2200" dirty="0">
+              <a:t>cpp</a:t>
+            </a:r>
+            <a:r>
+              <a:rPr lang="en-CA" dirty="0">
                 <a:solidFill>
                   <a:schemeClr val="accent5">
                     <a:lumMod val="75000"/>
                   </a:schemeClr>
                 </a:solidFill>
               </a:rPr>
-              <a:t>template &lt;typename T, int size&gt; class </a:t>
-            </a:r>
-            <a:r>
-              <a:rPr lang="en-CA" sz="2200" dirty="0" err="1">
+              <a:t> file</a:t>
+            </a:r>
+          </a:p>
+          <a:p>
+            <a:pPr lvl="1"/>
+            <a:r>
+              <a:rPr lang="en-CA" dirty="0">
                 <a:solidFill>
                   <a:schemeClr val="accent5">
                     <a:lumMod val="75000"/>
                   </a:schemeClr>
                 </a:solidFill>
               </a:rPr>
-              <a:t>MyClass</a:t>
-            </a:r>
-            <a:endParaRPr lang="en-CA" sz="2200" dirty="0">
-              <a:solidFill>
-                <a:schemeClr val="accent5">
-                  <a:lumMod val="75000"/>
-                </a:schemeClr>
-              </a:solidFill>
-            </a:endParaRPr>
-          </a:p>
-          <a:p>
-            <a:r>
-              <a:rPr lang="en-CA" sz="2200" dirty="0">
+              <a:t>Get it to work</a:t>
+            </a:r>
+          </a:p>
+          <a:p>
+            <a:r>
+              <a:rPr lang="en-CA" dirty="0">
                 <a:solidFill>
                   <a:schemeClr val="accent5">
                     <a:lumMod val="75000"/>
                   </a:schemeClr>
                 </a:solidFill>
               </a:rPr>
-              <a:t>{</a:t>
-            </a:r>
-          </a:p>
-          <a:p>
-            <a:r>
-              <a:rPr lang="en-CA" sz="2200" dirty="0">
+              <a:t>Add “template &lt;class WHATEVER&gt;” to the top (usually “T”)</a:t>
+            </a:r>
+          </a:p>
+          <a:p>
+            <a:r>
+              <a:rPr lang="en-CA" dirty="0">
                 <a:solidFill>
                   <a:schemeClr val="accent5">
                     <a:lumMod val="75000"/>
                   </a:schemeClr>
                 </a:solidFill>
               </a:rPr>
-              <a:t>    T[size]; // length of array is passed in size</a:t>
-            </a:r>
-          </a:p>
-          <a:p>
-            <a:r>
-              <a:rPr lang="en-CA" sz="2200" dirty="0">
+              <a:t>Move all the code you had in the </a:t>
+            </a:r>
+            <a:r>
+              <a:rPr lang="en-CA" dirty="0" err="1">
                 <a:solidFill>
                   <a:schemeClr val="accent5">
                     <a:lumMod val="75000"/>
                   </a:schemeClr>
                 </a:solidFill>
               </a:rPr>
-              <a:t>public:</a:t>
-            </a:r>
-          </a:p>
-          <a:p>
-            <a:r>
-              <a:rPr lang="en-CA" sz="2200" dirty="0">
+              <a:t>cpp</a:t>
+            </a:r>
+            <a:r>
+              <a:rPr lang="en-CA" dirty="0">
                 <a:solidFill>
                   <a:schemeClr val="accent5">
                     <a:lumMod val="75000"/>
                   </a:schemeClr>
                 </a:solidFill>
               </a:rPr>
-              <a:t>	</a:t>
-            </a:r>
-            <a:r>
-              <a:rPr lang="en-CA" sz="2200" dirty="0" err="1">
+              <a:t> file into the header</a:t>
+            </a:r>
+          </a:p>
+          <a:p>
+            <a:r>
+              <a:rPr lang="en-CA" dirty="0">
                 <a:solidFill>
                   <a:schemeClr val="accent5">
                     <a:lumMod val="75000"/>
                   </a:schemeClr>
                 </a:solidFill>
               </a:rPr>
-              <a:t>MyClass</a:t>
-            </a:r>
-            <a:r>
-              <a:rPr lang="en-CA" sz="2200" dirty="0">
+              <a:t>MAKE SURE IT STILL WORKS </a:t>
+            </a:r>
+          </a:p>
+          <a:p>
+            <a:r>
+              <a:rPr lang="en-CA" dirty="0">
                 <a:solidFill>
                   <a:schemeClr val="accent5">
                     <a:lumMod val="75000"/>
                   </a:schemeClr>
                 </a:solidFill>
               </a:rPr>
-              <a:t>() {</a:t>
-            </a:r>
-          </a:p>
-          <a:p>
-            <a:r>
-              <a:rPr lang="en-CA" sz="2200" dirty="0">
-                <a:solidFill>
-                  <a:schemeClr val="accent5">
-                    <a:lumMod val="75000"/>
-                  </a:schemeClr>
-                </a:solidFill>
-              </a:rPr>
-              <a:t>	   register int i;</a:t>
-            </a:r>
-          </a:p>
-          <a:p>
-            <a:r>
-              <a:rPr lang="en-CA" sz="2200" dirty="0">
-                <a:solidFill>
-                  <a:schemeClr val="accent5">
-                    <a:lumMod val="75000"/>
-                  </a:schemeClr>
-                </a:solidFill>
-              </a:rPr>
-              <a:t>	   for(i=0; i&lt;size; i++) a[i] = i;</a:t>
-            </a:r>
-          </a:p>
-          <a:p>
-            <a:r>
-              <a:rPr lang="en-CA" sz="2200" dirty="0">
-                <a:solidFill>
-                  <a:schemeClr val="accent5">
-                    <a:lumMod val="75000"/>
-                  </a:schemeClr>
-                </a:solidFill>
-              </a:rPr>
-              <a:t>	}</a:t>
-            </a:r>
-          </a:p>
-          <a:p>
-            <a:r>
-              <a:rPr lang="en-CA" sz="2200" dirty="0">
-                <a:solidFill>
-                  <a:schemeClr val="accent5">
-                    <a:lumMod val="75000"/>
-                  </a:schemeClr>
-                </a:solidFill>
-              </a:rPr>
-              <a:t>};</a:t>
+              <a:t>Replace the specific type in the code with the class “T” type thing</a:t>
             </a:r>
           </a:p>
         </p:txBody>
@@ -4686,7 +4579,7 @@
     </p:spTree>
     <p:extLst>
       <p:ext uri="{BB962C8B-B14F-4D97-AF65-F5344CB8AC3E}">
-        <p14:creationId xmlns:p14="http://schemas.microsoft.com/office/powerpoint/2010/main" val="2782611580"/>
+        <p14:creationId xmlns:p14="http://schemas.microsoft.com/office/powerpoint/2010/main" val="3028938646"/>
       </p:ext>
     </p:extLst>
   </p:cSld>
@@ -4715,13 +4608,7 @@
       </p:grpSpPr>
       <p:sp>
         <p:nvSpPr>
-          <p:cNvPr id="2" name="Title 1">
-            <a:extLst>
-              <a:ext uri="{FF2B5EF4-FFF2-40B4-BE49-F238E27FC236}">
-                <a16:creationId xmlns:a16="http://schemas.microsoft.com/office/drawing/2014/main" id="{47859377-94DE-4A63-4EB3-B2F23A5ED896}"/>
-              </a:ext>
-            </a:extLst>
-          </p:cNvPr>
+          <p:cNvPr id="2" name="Title 1"/>
           <p:cNvSpPr>
             <a:spLocks noGrp="1"/>
           </p:cNvSpPr>
@@ -4729,48 +4616,322 @@
             <p:ph type="title"/>
           </p:nvPr>
         </p:nvSpPr>
-        <p:spPr/>
-        <p:txBody>
-          <a:bodyPr/>
-          <a:lstStyle/>
-          <a:p>
-            <a:r>
-              <a:rPr lang="en-GB" dirty="0"/>
-              <a:t>Function Templates</a:t>
-            </a:r>
-            <a:endParaRPr lang="en-CA" dirty="0"/>
-          </a:p>
-        </p:txBody>
-      </p:sp>
-      <p:sp>
-        <p:nvSpPr>
-          <p:cNvPr id="3" name="Text Placeholder 2">
-            <a:extLst>
-              <a:ext uri="{FF2B5EF4-FFF2-40B4-BE49-F238E27FC236}">
-                <a16:creationId xmlns:a16="http://schemas.microsoft.com/office/drawing/2014/main" id="{89659E43-23FA-1A7E-31D0-76298625441D}"/>
-              </a:ext>
-            </a:extLst>
-          </p:cNvPr>
-          <p:cNvSpPr>
-            <a:spLocks noGrp="1"/>
-          </p:cNvSpPr>
-          <p:nvPr>
-            <p:ph type="body" idx="1"/>
-          </p:nvPr>
-        </p:nvSpPr>
-        <p:spPr/>
-        <p:txBody>
-          <a:bodyPr/>
-          <a:lstStyle/>
-          <a:p>
-            <a:endParaRPr lang="en-CA" dirty="0"/>
+        <p:spPr>
+          <a:xfrm>
+            <a:off x="2039815" y="182245"/>
+            <a:ext cx="9710907" cy="830629"/>
+          </a:xfrm>
+        </p:spPr>
+        <p:txBody>
+          <a:bodyPr>
+            <a:normAutofit fontScale="90000"/>
+          </a:bodyPr>
+          <a:lstStyle/>
+          <a:p>
+            <a:r>
+              <a:rPr lang="en-CA" dirty="0">
+                <a:solidFill>
+                  <a:schemeClr val="bg1"/>
+                </a:solidFill>
+              </a:rPr>
+              <a:t>Class Template with non-generic arguments</a:t>
+            </a:r>
+          </a:p>
+        </p:txBody>
+      </p:sp>
+      <p:sp>
+        <p:nvSpPr>
+          <p:cNvPr id="3" name="Content Placeholder 2"/>
+          <p:cNvSpPr>
+            <a:spLocks noGrp="1"/>
+          </p:cNvSpPr>
+          <p:nvPr>
+            <p:ph idx="1"/>
+          </p:nvPr>
+        </p:nvSpPr>
+        <p:spPr>
+          <a:xfrm>
+            <a:off x="168499" y="1290001"/>
+            <a:ext cx="10515600" cy="2758538"/>
+          </a:xfrm>
+        </p:spPr>
+        <p:txBody>
+          <a:bodyPr>
+            <a:normAutofit fontScale="92500" lnSpcReduction="20000"/>
+          </a:bodyPr>
+          <a:lstStyle/>
+          <a:p>
+            <a:r>
+              <a:rPr lang="en-CA" dirty="0"/>
+              <a:t>For a generic class, you may also specify non-type arguments. </a:t>
+            </a:r>
+          </a:p>
+          <a:p>
+            <a:r>
+              <a:rPr lang="en-CA" dirty="0"/>
+              <a:t>You can specify what you would normally think of as a standard argument, such as an integer or a pointer. </a:t>
+            </a:r>
+          </a:p>
+          <a:p>
+            <a:r>
+              <a:rPr lang="en-CA" dirty="0"/>
+              <a:t>The syntax to accomplish this is the same as for normal function parameters: simply include the type and name of the argument.</a:t>
+            </a:r>
+          </a:p>
+          <a:p>
+            <a:r>
+              <a:rPr lang="en-CA" dirty="0"/>
+              <a:t>Declare an object of type </a:t>
+            </a:r>
+            <a:r>
+              <a:rPr lang="en-CA" dirty="0" err="1"/>
+              <a:t>MyClass</a:t>
+            </a:r>
+            <a:r>
+              <a:rPr lang="en-CA" dirty="0"/>
+              <a:t>:</a:t>
+            </a:r>
+          </a:p>
+          <a:p>
+            <a:pPr marL="0" indent="0">
+              <a:buNone/>
+            </a:pPr>
+            <a:r>
+              <a:rPr lang="en-CA" dirty="0"/>
+              <a:t>   </a:t>
+            </a:r>
+            <a:r>
+              <a:rPr lang="en-CA" sz="3200" dirty="0" err="1">
+                <a:solidFill>
+                  <a:schemeClr val="accent5">
+                    <a:lumMod val="75000"/>
+                  </a:schemeClr>
+                </a:solidFill>
+              </a:rPr>
+              <a:t>MyClass</a:t>
+            </a:r>
+            <a:r>
+              <a:rPr lang="en-CA" sz="3200" dirty="0">
+                <a:solidFill>
+                  <a:schemeClr val="accent5">
+                    <a:lumMod val="75000"/>
+                  </a:schemeClr>
+                </a:solidFill>
+              </a:rPr>
+              <a:t> &lt;int, 10&gt; </a:t>
+            </a:r>
+            <a:r>
+              <a:rPr lang="en-CA" sz="3200" dirty="0" err="1">
+                <a:solidFill>
+                  <a:schemeClr val="accent5">
+                    <a:lumMod val="75000"/>
+                  </a:schemeClr>
+                </a:solidFill>
+              </a:rPr>
+              <a:t>intFoo</a:t>
+            </a:r>
+            <a:r>
+              <a:rPr lang="en-CA" sz="3200" dirty="0">
+                <a:solidFill>
+                  <a:schemeClr val="accent5">
+                    <a:lumMod val="75000"/>
+                  </a:schemeClr>
+                </a:solidFill>
+              </a:rPr>
+              <a:t>;</a:t>
+            </a:r>
+          </a:p>
+        </p:txBody>
+      </p:sp>
+      <p:sp>
+        <p:nvSpPr>
+          <p:cNvPr id="5" name="TextBox 4"/>
+          <p:cNvSpPr txBox="1"/>
+          <p:nvPr/>
+        </p:nvSpPr>
+        <p:spPr>
+          <a:xfrm>
+            <a:off x="5305331" y="3130500"/>
+            <a:ext cx="6651443" cy="3477875"/>
+          </a:xfrm>
+          <a:prstGeom prst="rect">
+            <a:avLst/>
+          </a:prstGeom>
+          <a:noFill/>
+          <a:ln>
+            <a:solidFill>
+              <a:schemeClr val="accent1"/>
+            </a:solidFill>
+          </a:ln>
+        </p:spPr>
+        <p:txBody>
+          <a:bodyPr wrap="square" rtlCol="0">
+            <a:spAutoFit/>
+          </a:bodyPr>
+          <a:lstStyle/>
+          <a:p>
+            <a:r>
+              <a:rPr lang="en-CA" sz="2200" dirty="0">
+                <a:solidFill>
+                  <a:schemeClr val="accent5">
+                    <a:lumMod val="75000"/>
+                  </a:schemeClr>
+                </a:solidFill>
+              </a:rPr>
+              <a:t>// Here, int size is a non-type argument.</a:t>
+            </a:r>
+          </a:p>
+          <a:p>
+            <a:r>
+              <a:rPr lang="en-CA" sz="2200" dirty="0">
+                <a:solidFill>
+                  <a:schemeClr val="accent5">
+                    <a:lumMod val="75000"/>
+                  </a:schemeClr>
+                </a:solidFill>
+              </a:rPr>
+              <a:t>template &lt;typename T, int size&gt; class </a:t>
+            </a:r>
+            <a:r>
+              <a:rPr lang="en-CA" sz="2200" dirty="0" err="1">
+                <a:solidFill>
+                  <a:schemeClr val="accent5">
+                    <a:lumMod val="75000"/>
+                  </a:schemeClr>
+                </a:solidFill>
+              </a:rPr>
+              <a:t>MyClass</a:t>
+            </a:r>
+            <a:endParaRPr lang="en-CA" sz="2200" dirty="0">
+              <a:solidFill>
+                <a:schemeClr val="accent5">
+                  <a:lumMod val="75000"/>
+                </a:schemeClr>
+              </a:solidFill>
+            </a:endParaRPr>
+          </a:p>
+          <a:p>
+            <a:r>
+              <a:rPr lang="en-CA" sz="2200" dirty="0">
+                <a:solidFill>
+                  <a:schemeClr val="accent5">
+                    <a:lumMod val="75000"/>
+                  </a:schemeClr>
+                </a:solidFill>
+              </a:rPr>
+              <a:t>{</a:t>
+            </a:r>
+          </a:p>
+          <a:p>
+            <a:r>
+              <a:rPr lang="en-CA" sz="2200" dirty="0">
+                <a:solidFill>
+                  <a:schemeClr val="accent5">
+                    <a:lumMod val="75000"/>
+                  </a:schemeClr>
+                </a:solidFill>
+              </a:rPr>
+              <a:t>    T[size]; // length of array is passed in size</a:t>
+            </a:r>
+          </a:p>
+          <a:p>
+            <a:r>
+              <a:rPr lang="en-CA" sz="2200" dirty="0">
+                <a:solidFill>
+                  <a:schemeClr val="accent5">
+                    <a:lumMod val="75000"/>
+                  </a:schemeClr>
+                </a:solidFill>
+              </a:rPr>
+              <a:t>public:</a:t>
+            </a:r>
+          </a:p>
+          <a:p>
+            <a:r>
+              <a:rPr lang="en-CA" sz="2200" dirty="0">
+                <a:solidFill>
+                  <a:schemeClr val="accent5">
+                    <a:lumMod val="75000"/>
+                  </a:schemeClr>
+                </a:solidFill>
+              </a:rPr>
+              <a:t>	</a:t>
+            </a:r>
+            <a:r>
+              <a:rPr lang="en-CA" sz="2200" dirty="0" err="1">
+                <a:solidFill>
+                  <a:schemeClr val="accent5">
+                    <a:lumMod val="75000"/>
+                  </a:schemeClr>
+                </a:solidFill>
+              </a:rPr>
+              <a:t>MyClass</a:t>
+            </a:r>
+            <a:r>
+              <a:rPr lang="en-CA" sz="2200" dirty="0">
+                <a:solidFill>
+                  <a:schemeClr val="accent5">
+                    <a:lumMod val="75000"/>
+                  </a:schemeClr>
+                </a:solidFill>
+              </a:rPr>
+              <a:t>() {</a:t>
+            </a:r>
+          </a:p>
+          <a:p>
+            <a:r>
+              <a:rPr lang="en-CA" sz="2200" dirty="0">
+                <a:solidFill>
+                  <a:schemeClr val="accent5">
+                    <a:lumMod val="75000"/>
+                  </a:schemeClr>
+                </a:solidFill>
+              </a:rPr>
+              <a:t>	   register int i;</a:t>
+            </a:r>
+          </a:p>
+          <a:p>
+            <a:r>
+              <a:rPr lang="en-CA" sz="2200" dirty="0">
+                <a:solidFill>
+                  <a:schemeClr val="accent5">
+                    <a:lumMod val="75000"/>
+                  </a:schemeClr>
+                </a:solidFill>
+              </a:rPr>
+              <a:t>	   for(i=0; i&lt;size; i++) a[i] = i;</a:t>
+            </a:r>
+          </a:p>
+          <a:p>
+            <a:r>
+              <a:rPr lang="en-CA" sz="2200" dirty="0">
+                <a:solidFill>
+                  <a:schemeClr val="accent5">
+                    <a:lumMod val="75000"/>
+                  </a:schemeClr>
+                </a:solidFill>
+              </a:rPr>
+              <a:t>	}</a:t>
+            </a:r>
+          </a:p>
+          <a:p>
+            <a:r>
+              <a:rPr lang="en-CA" sz="2200" dirty="0">
+                <a:solidFill>
+                  <a:schemeClr val="accent5">
+                    <a:lumMod val="75000"/>
+                  </a:schemeClr>
+                </a:solidFill>
+              </a:rPr>
+              <a:t>};</a:t>
+            </a:r>
           </a:p>
         </p:txBody>
       </p:sp>
     </p:spTree>
     <p:extLst>
       <p:ext uri="{BB962C8B-B14F-4D97-AF65-F5344CB8AC3E}">
-        <p14:creationId xmlns:p14="http://schemas.microsoft.com/office/powerpoint/2010/main" val="788620326"/>
+        <p14:creationId xmlns:p14="http://schemas.microsoft.com/office/powerpoint/2010/main" val="2782611580"/>
       </p:ext>
     </p:extLst>
   </p:cSld>
@@ -4799,7 +4960,13 @@
       </p:grpSpPr>
       <p:sp>
         <p:nvSpPr>
-          <p:cNvPr id="2" name="Title 1"/>
+          <p:cNvPr id="2" name="Title 1">
+            <a:extLst>
+              <a:ext uri="{FF2B5EF4-FFF2-40B4-BE49-F238E27FC236}">
+                <a16:creationId xmlns:a16="http://schemas.microsoft.com/office/drawing/2014/main" id="{47859377-94DE-4A63-4EB3-B2F23A5ED896}"/>
+              </a:ext>
+            </a:extLst>
+          </p:cNvPr>
           <p:cNvSpPr>
             <a:spLocks noGrp="1"/>
           </p:cNvSpPr>
@@ -4807,87 +4974,48 @@
             <p:ph type="title"/>
           </p:nvPr>
         </p:nvSpPr>
-        <p:spPr>
-          <a:xfrm>
-            <a:off x="2039815" y="182245"/>
-            <a:ext cx="9710907" cy="830629"/>
-          </a:xfrm>
-        </p:spPr>
-        <p:txBody>
-          <a:bodyPr>
-            <a:normAutofit/>
-          </a:bodyPr>
-          <a:lstStyle/>
-          <a:p>
-            <a:r>
-              <a:rPr lang="en-CA" dirty="0">
-                <a:solidFill>
-                  <a:schemeClr val="bg1"/>
-                </a:solidFill>
-              </a:rPr>
-              <a:t>Function Template</a:t>
-            </a:r>
-          </a:p>
-        </p:txBody>
-      </p:sp>
-      <p:sp>
-        <p:nvSpPr>
-          <p:cNvPr id="3" name="Content Placeholder 2"/>
-          <p:cNvSpPr>
-            <a:spLocks noGrp="1"/>
-          </p:cNvSpPr>
-          <p:nvPr>
-            <p:ph idx="1"/>
-          </p:nvPr>
-        </p:nvSpPr>
         <p:spPr/>
         <p:txBody>
-          <a:bodyPr>
-            <a:normAutofit fontScale="92500" lnSpcReduction="10000"/>
-          </a:bodyPr>
-          <a:lstStyle/>
-          <a:p>
-            <a:r>
-              <a:rPr lang="en-CA" dirty="0"/>
-              <a:t>A generic function defines a general set of operations that will be applied to various types of data</a:t>
-            </a:r>
-          </a:p>
-          <a:p>
-            <a:r>
-              <a:rPr lang="en-CA" dirty="0"/>
-              <a:t>The type of data that the function will operate upon is passed to it as a parameter.</a:t>
-            </a:r>
-          </a:p>
-          <a:p>
-            <a:r>
-              <a:rPr lang="en-CA" dirty="0"/>
-              <a:t>Through a generic function, a single general procedure can be applied to a wide range of data.</a:t>
-            </a:r>
-          </a:p>
-          <a:p>
-            <a:r>
-              <a:rPr lang="en-CA" dirty="0"/>
-              <a:t>Many algorithms are logically the same no matter what type of data is being operated upon. For example, the Quicksort sorting algorithm is the same whether it is applied to an array of integers or an array of floats. </a:t>
-            </a:r>
-          </a:p>
-          <a:p>
-            <a:r>
-              <a:rPr lang="en-CA" dirty="0"/>
-              <a:t>Just that the type of the data being sorted is different. </a:t>
-            </a:r>
-          </a:p>
-          <a:p>
-            <a:r>
-              <a:rPr lang="en-CA" dirty="0"/>
-              <a:t>By creating a generic function, we can define the nature of the algorithm, independent of any data.</a:t>
-            </a:r>
+          <a:bodyPr/>
+          <a:lstStyle/>
+          <a:p>
+            <a:r>
+              <a:rPr lang="en-GB" dirty="0"/>
+              <a:t>Function Templates</a:t>
+            </a:r>
+            <a:endParaRPr lang="en-CA" dirty="0"/>
+          </a:p>
+        </p:txBody>
+      </p:sp>
+      <p:sp>
+        <p:nvSpPr>
+          <p:cNvPr id="3" name="Text Placeholder 2">
+            <a:extLst>
+              <a:ext uri="{FF2B5EF4-FFF2-40B4-BE49-F238E27FC236}">
+                <a16:creationId xmlns:a16="http://schemas.microsoft.com/office/drawing/2014/main" id="{89659E43-23FA-1A7E-31D0-76298625441D}"/>
+              </a:ext>
+            </a:extLst>
+          </p:cNvPr>
+          <p:cNvSpPr>
+            <a:spLocks noGrp="1"/>
+          </p:cNvSpPr>
+          <p:nvPr>
+            <p:ph type="body" idx="1"/>
+          </p:nvPr>
+        </p:nvSpPr>
+        <p:spPr/>
+        <p:txBody>
+          <a:bodyPr/>
+          <a:lstStyle/>
+          <a:p>
+            <a:endParaRPr lang="en-CA" dirty="0"/>
           </a:p>
         </p:txBody>
       </p:sp>
     </p:spTree>
     <p:extLst>
       <p:ext uri="{BB962C8B-B14F-4D97-AF65-F5344CB8AC3E}">
-        <p14:creationId xmlns:p14="http://schemas.microsoft.com/office/powerpoint/2010/main" val="2914200428"/>
+        <p14:creationId xmlns:p14="http://schemas.microsoft.com/office/powerpoint/2010/main" val="788620326"/>
       </p:ext>
     </p:extLst>
   </p:cSld>
@@ -4959,115 +5087,52 @@
         </p:nvSpPr>
         <p:spPr/>
         <p:txBody>
-          <a:bodyPr/>
+          <a:bodyPr>
+            <a:normAutofit fontScale="92500" lnSpcReduction="10000"/>
+          </a:bodyPr>
           <a:lstStyle/>
           <a:p>
             <a:r>
               <a:rPr lang="en-CA" dirty="0"/>
-              <a:t>A generic function is created using the keyword template. </a:t>
+              <a:t>A generic function defines a general set of operations that will be applied to various types of data</a:t>
             </a:r>
           </a:p>
           <a:p>
             <a:r>
               <a:rPr lang="en-CA" dirty="0"/>
-              <a:t>It is used to create a template (or framework) that describes what a function will do, leaving it to the compiler to fill in the details as needed. </a:t>
+              <a:t>The type of data that the function will operate upon is passed to it as a parameter.</a:t>
             </a:r>
           </a:p>
           <a:p>
             <a:r>
               <a:rPr lang="en-CA" dirty="0"/>
-              <a:t>The form of a template function definition :</a:t>
-            </a:r>
-          </a:p>
-          <a:p>
-            <a:pPr marL="0" indent="0">
-              <a:buNone/>
-            </a:pPr>
-            <a:r>
-              <a:rPr lang="en-CA" dirty="0">
-                <a:solidFill>
-                  <a:schemeClr val="accent1">
-                    <a:lumMod val="75000"/>
-                  </a:schemeClr>
-                </a:solidFill>
-              </a:rPr>
-              <a:t>template &lt;</a:t>
-            </a:r>
-            <a:r>
-              <a:rPr lang="en-CA" dirty="0" err="1">
-                <a:solidFill>
-                  <a:schemeClr val="accent1">
-                    <a:lumMod val="75000"/>
-                  </a:schemeClr>
-                </a:solidFill>
-              </a:rPr>
-              <a:t>typename</a:t>
-            </a:r>
-            <a:r>
-              <a:rPr lang="en-CA" dirty="0">
-                <a:solidFill>
-                  <a:schemeClr val="accent1">
-                    <a:lumMod val="75000"/>
-                  </a:schemeClr>
-                </a:solidFill>
-              </a:rPr>
-              <a:t> type&gt; return-type function-name(parameter list)</a:t>
-            </a:r>
-          </a:p>
-          <a:p>
-            <a:pPr marL="0" indent="0">
-              <a:buNone/>
-            </a:pPr>
-            <a:r>
-              <a:rPr lang="en-CA" dirty="0">
-                <a:solidFill>
-                  <a:schemeClr val="accent1">
-                    <a:lumMod val="75000"/>
-                  </a:schemeClr>
-                </a:solidFill>
-              </a:rPr>
-              <a:t>{</a:t>
-            </a:r>
-          </a:p>
-          <a:p>
-            <a:pPr marL="0" indent="0">
-              <a:buNone/>
-            </a:pPr>
-            <a:r>
-              <a:rPr lang="en-CA" dirty="0">
-                <a:solidFill>
-                  <a:schemeClr val="accent1">
-                    <a:lumMod val="75000"/>
-                  </a:schemeClr>
-                </a:solidFill>
-              </a:rPr>
-              <a:t>// body of function</a:t>
-            </a:r>
-          </a:p>
-          <a:p>
-            <a:pPr marL="0" indent="0">
-              <a:buNone/>
-            </a:pPr>
-            <a:r>
-              <a:rPr lang="en-CA" dirty="0">
-                <a:solidFill>
-                  <a:schemeClr val="accent1">
-                    <a:lumMod val="75000"/>
-                  </a:schemeClr>
-                </a:solidFill>
-              </a:rPr>
-              <a:t>}</a:t>
-            </a:r>
-          </a:p>
-          <a:p>
-            <a:endParaRPr lang="en-CA" dirty="0"/>
+              <a:t>Through a generic function, a single general procedure can be applied to a wide range of data.</a:t>
+            </a:r>
+          </a:p>
+          <a:p>
+            <a:r>
+              <a:rPr lang="en-CA" dirty="0"/>
+              <a:t>Many algorithms are logically the same no matter what type of data is being operated upon. For example, the Quicksort sorting algorithm is the same whether it is applied to an array of integers or an array of floats. </a:t>
+            </a:r>
+          </a:p>
+          <a:p>
+            <a:r>
+              <a:rPr lang="en-CA" dirty="0"/>
+              <a:t>Just that the type of the data being sorted is different. </a:t>
+            </a:r>
+          </a:p>
+          <a:p>
+            <a:r>
+              <a:rPr lang="en-CA" dirty="0"/>
+              <a:t>By creating a generic function, we can define the nature of the algorithm, independent of any data.</a:t>
+            </a:r>
           </a:p>
         </p:txBody>
       </p:sp>
     </p:spTree>
     <p:extLst>
       <p:ext uri="{BB962C8B-B14F-4D97-AF65-F5344CB8AC3E}">
-        <p14:creationId xmlns:p14="http://schemas.microsoft.com/office/powerpoint/2010/main" val="2518543676"/>
+        <p14:creationId xmlns:p14="http://schemas.microsoft.com/office/powerpoint/2010/main" val="2914200428"/>
       </p:ext>
     </p:extLst>
   </p:cSld>
@@ -5137,175 +5202,117 @@
             <p:ph idx="1"/>
           </p:nvPr>
         </p:nvSpPr>
-        <p:spPr>
-          <a:xfrm>
-            <a:off x="838200" y="1508943"/>
-            <a:ext cx="10515600" cy="2298782"/>
-          </a:xfrm>
-        </p:spPr>
+        <p:spPr/>
         <p:txBody>
           <a:bodyPr/>
           <a:lstStyle/>
           <a:p>
             <a:r>
-              <a:rPr lang="en-CA" dirty="0">
-                <a:solidFill>
-                  <a:schemeClr val="accent1">
-                    <a:lumMod val="75000"/>
-                  </a:schemeClr>
-                </a:solidFill>
-              </a:rPr>
-              <a:t>T </a:t>
-            </a:r>
-            <a:r>
               <a:rPr lang="en-CA" dirty="0"/>
-              <a:t>is a placeholder name for a data type used by the function. </a:t>
+              <a:t>A generic function is created using the keyword template. </a:t>
             </a:r>
           </a:p>
           <a:p>
             <a:r>
               <a:rPr lang="en-CA" dirty="0"/>
-              <a:t>This name may be used within the function definition. However, it is only a placeholder that the compiler will automatically replace with an actual data type when it creates a specific version of the function.</a:t>
+              <a:t>It is used to create a template (or framework) that describes what a function will do, leaving it to the compiler to fill in the details as needed. </a:t>
             </a:r>
           </a:p>
           <a:p>
             <a:r>
               <a:rPr lang="en-CA" dirty="0"/>
-              <a:t>Example:</a:t>
+              <a:t>The form of a template function definition :</a:t>
             </a:r>
           </a:p>
           <a:p>
             <a:pPr marL="0" indent="0">
               <a:buNone/>
             </a:pPr>
+            <a:r>
+              <a:rPr lang="en-CA" dirty="0">
+                <a:solidFill>
+                  <a:schemeClr val="accent1">
+                    <a:lumMod val="75000"/>
+                  </a:schemeClr>
+                </a:solidFill>
+              </a:rPr>
+              <a:t>template &lt;</a:t>
+            </a:r>
+            <a:r>
+              <a:rPr lang="en-CA" dirty="0" err="1">
+                <a:solidFill>
+                  <a:schemeClr val="accent1">
+                    <a:lumMod val="75000"/>
+                  </a:schemeClr>
+                </a:solidFill>
+              </a:rPr>
+              <a:t>typename</a:t>
+            </a:r>
+            <a:r>
+              <a:rPr lang="en-CA" dirty="0">
+                <a:solidFill>
+                  <a:schemeClr val="accent1">
+                    <a:lumMod val="75000"/>
+                  </a:schemeClr>
+                </a:solidFill>
+              </a:rPr>
+              <a:t> type&gt; return-type function-name(parameter list)</a:t>
+            </a:r>
+          </a:p>
+          <a:p>
+            <a:pPr marL="0" indent="0">
+              <a:buNone/>
+            </a:pPr>
+            <a:r>
+              <a:rPr lang="en-CA" dirty="0">
+                <a:solidFill>
+                  <a:schemeClr val="accent1">
+                    <a:lumMod val="75000"/>
+                  </a:schemeClr>
+                </a:solidFill>
+              </a:rPr>
+              <a:t>{</a:t>
+            </a:r>
+          </a:p>
+          <a:p>
+            <a:pPr marL="0" indent="0">
+              <a:buNone/>
+            </a:pPr>
+            <a:r>
+              <a:rPr lang="en-CA" dirty="0">
+                <a:solidFill>
+                  <a:schemeClr val="accent1">
+                    <a:lumMod val="75000"/>
+                  </a:schemeClr>
+                </a:solidFill>
+              </a:rPr>
+              <a:t>// body of function</a:t>
+            </a:r>
+          </a:p>
+          <a:p>
+            <a:pPr marL="0" indent="0">
+              <a:buNone/>
+            </a:pPr>
+            <a:r>
+              <a:rPr lang="en-CA" dirty="0">
+                <a:solidFill>
+                  <a:schemeClr val="accent1">
+                    <a:lumMod val="75000"/>
+                  </a:schemeClr>
+                </a:solidFill>
+              </a:rPr>
+              <a:t>}</a:t>
+            </a:r>
+          </a:p>
+          <a:p>
             <a:endParaRPr lang="en-CA" dirty="0"/>
-          </a:p>
-        </p:txBody>
-      </p:sp>
-      <p:sp>
-        <p:nvSpPr>
-          <p:cNvPr id="4" name="TextBox 3"/>
-          <p:cNvSpPr txBox="1"/>
-          <p:nvPr/>
-        </p:nvSpPr>
-        <p:spPr>
-          <a:xfrm>
-            <a:off x="3480180" y="3193575"/>
-            <a:ext cx="7873619" cy="2677656"/>
-          </a:xfrm>
-          <a:prstGeom prst="rect">
-            <a:avLst/>
-          </a:prstGeom>
-          <a:noFill/>
-          <a:ln>
-            <a:solidFill>
-              <a:schemeClr val="accent1"/>
-            </a:solidFill>
-          </a:ln>
-        </p:spPr>
-        <p:txBody>
-          <a:bodyPr wrap="square" rtlCol="0">
-            <a:spAutoFit/>
-          </a:bodyPr>
-          <a:lstStyle/>
-          <a:p>
-            <a:r>
-              <a:rPr lang="en-CA" sz="2800" dirty="0">
-                <a:solidFill>
-                  <a:schemeClr val="accent1">
-                    <a:lumMod val="75000"/>
-                  </a:schemeClr>
-                </a:solidFill>
-              </a:rPr>
-              <a:t>template &lt;</a:t>
-            </a:r>
-            <a:r>
-              <a:rPr lang="en-CA" sz="2800" dirty="0" err="1">
-                <a:solidFill>
-                  <a:schemeClr val="accent1">
-                    <a:lumMod val="75000"/>
-                  </a:schemeClr>
-                </a:solidFill>
-              </a:rPr>
-              <a:t>typename</a:t>
-            </a:r>
-            <a:r>
-              <a:rPr lang="en-CA" sz="2800" dirty="0">
-                <a:solidFill>
-                  <a:schemeClr val="accent1">
-                    <a:lumMod val="75000"/>
-                  </a:schemeClr>
-                </a:solidFill>
-              </a:rPr>
-              <a:t> T&gt; void swap(T&amp; a, T&amp; b)</a:t>
-            </a:r>
-          </a:p>
-          <a:p>
-            <a:r>
-              <a:rPr lang="en-CA" sz="2800" dirty="0">
-                <a:solidFill>
-                  <a:schemeClr val="accent1">
-                    <a:lumMod val="75000"/>
-                  </a:schemeClr>
-                </a:solidFill>
-              </a:rPr>
-              <a:t>{</a:t>
-            </a:r>
-          </a:p>
-          <a:p>
-            <a:r>
-              <a:rPr lang="en-CA" sz="2800" dirty="0">
-                <a:solidFill>
-                  <a:schemeClr val="accent1">
-                    <a:lumMod val="75000"/>
-                  </a:schemeClr>
-                </a:solidFill>
-              </a:rPr>
-              <a:t>      T temp = a;</a:t>
-            </a:r>
-          </a:p>
-          <a:p>
-            <a:r>
-              <a:rPr lang="en-CA" sz="2800" dirty="0">
-                <a:solidFill>
-                  <a:schemeClr val="accent1">
-                    <a:lumMod val="75000"/>
-                  </a:schemeClr>
-                </a:solidFill>
-              </a:rPr>
-              <a:t>      a = b;</a:t>
-            </a:r>
-          </a:p>
-          <a:p>
-            <a:r>
-              <a:rPr lang="en-CA" sz="2800" dirty="0">
-                <a:solidFill>
-                  <a:schemeClr val="accent1">
-                    <a:lumMod val="75000"/>
-                  </a:schemeClr>
-                </a:solidFill>
-              </a:rPr>
-              <a:t>      b = temp;</a:t>
-            </a:r>
-          </a:p>
-          <a:p>
-            <a:r>
-              <a:rPr lang="en-CA" sz="2800" dirty="0">
-                <a:solidFill>
-                  <a:schemeClr val="accent1">
-                    <a:lumMod val="75000"/>
-                  </a:schemeClr>
-                </a:solidFill>
-              </a:rPr>
-              <a:t>}</a:t>
-            </a:r>
           </a:p>
         </p:txBody>
       </p:sp>
     </p:spTree>
     <p:extLst>
       <p:ext uri="{BB962C8B-B14F-4D97-AF65-F5344CB8AC3E}">
-        <p14:creationId xmlns:p14="http://schemas.microsoft.com/office/powerpoint/2010/main" val="2796991752"/>
+        <p14:creationId xmlns:p14="http://schemas.microsoft.com/office/powerpoint/2010/main" val="2518543676"/>
       </p:ext>
     </p:extLst>
   </p:cSld>
@@ -5378,7 +5385,7 @@
         <p:spPr>
           <a:xfrm>
             <a:off x="838200" y="1508943"/>
-            <a:ext cx="10515600" cy="2721863"/>
+            <a:ext cx="10515600" cy="2298782"/>
           </a:xfrm>
         </p:spPr>
         <p:txBody>
@@ -5386,23 +5393,36 @@
           <a:lstStyle/>
           <a:p>
             <a:r>
+              <a:rPr lang="en-CA" dirty="0">
+                <a:solidFill>
+                  <a:schemeClr val="accent1">
+                    <a:lumMod val="75000"/>
+                  </a:schemeClr>
+                </a:solidFill>
+              </a:rPr>
+              <a:t>T </a:t>
+            </a:r>
+            <a:r>
               <a:rPr lang="en-CA" dirty="0"/>
-              <a:t> When the compiler creates a specific version of this function, it is said to have created a specialization. </a:t>
+              <a:t>is a placeholder name for a data type used by the function. </a:t>
             </a:r>
           </a:p>
           <a:p>
             <a:r>
               <a:rPr lang="en-CA" dirty="0"/>
-              <a:t>This is also called a generated function. The act of generating a function is referred to as instantiating it.</a:t>
+              <a:t>This name may be used within the function definition. However, it is only a placeholder that the compiler will automatically replace with an actual data type when it creates a specific version of the function.</a:t>
             </a:r>
           </a:p>
           <a:p>
             <a:r>
               <a:rPr lang="en-CA" dirty="0"/>
-              <a:t>You can define more than one generic data type in the template statement by using a comma-separated list.</a:t>
-            </a:r>
-          </a:p>
-          <a:p>
+              <a:t>Example:</a:t>
+            </a:r>
+          </a:p>
+          <a:p>
+            <a:pPr marL="0" indent="0">
+              <a:buNone/>
+            </a:pPr>
             <a:endParaRPr lang="en-CA" dirty="0"/>
           </a:p>
         </p:txBody>
@@ -5415,13 +5435,18 @@
         </p:nvSpPr>
         <p:spPr>
           <a:xfrm>
-            <a:off x="1093863" y="4441116"/>
-            <a:ext cx="10716978" cy="2246769"/>
+            <a:off x="3480180" y="3193575"/>
+            <a:ext cx="7873619" cy="2677656"/>
           </a:xfrm>
           <a:prstGeom prst="rect">
             <a:avLst/>
           </a:prstGeom>
           <a:noFill/>
+          <a:ln>
+            <a:solidFill>
+              <a:schemeClr val="accent1"/>
+            </a:solidFill>
+          </a:ln>
         </p:spPr>
         <p:txBody>
           <a:bodyPr wrap="square" rtlCol="0">
@@ -5457,18 +5482,22 @@
                   </a:schemeClr>
                 </a:solidFill>
               </a:rPr>
-              <a:t> T, </a:t>
-            </a:r>
-            <a:r>
-              <a:rPr lang="en-CA" sz="2800" dirty="0" err="1">
+              <a:t> T&gt; void swap(T&amp; a, T&amp; b)</a:t>
+            </a:r>
+          </a:p>
+          <a:p>
+            <a:r>
+              <a:rPr lang="en-CA" sz="2800" dirty="0">
                 <a:solidFill>
                   <a:schemeClr val="accent1">
                     <a:lumMod val="75000"/>
                   </a:schemeClr>
                 </a:solidFill>
               </a:rPr>
-              <a:t>typename</a:t>
-            </a:r>
+              <a:t>{</a:t>
+            </a:r>
+          </a:p>
+          <a:p>
             <a:r>
               <a:rPr lang="en-CA" sz="2800" dirty="0">
                 <a:solidFill>
@@ -5477,7 +5506,7 @@
                   </a:schemeClr>
                 </a:solidFill>
               </a:rPr>
-              <a:t> U&gt;</a:t>
+              <a:t>      T temp = a;</a:t>
             </a:r>
           </a:p>
           <a:p>
@@ -5489,7 +5518,7 @@
                   </a:schemeClr>
                 </a:solidFill>
               </a:rPr>
-              <a:t>void print(T&amp; x, U&amp; y)</a:t>
+              <a:t>      a = b;</a:t>
             </a:r>
           </a:p>
           <a:p>
@@ -5501,19 +5530,7 @@
                   </a:schemeClr>
                 </a:solidFill>
               </a:rPr>
-              <a:t>{</a:t>
-            </a:r>
-          </a:p>
-          <a:p>
-            <a:r>
-              <a:rPr lang="en-CA" sz="2800" dirty="0">
-                <a:solidFill>
-                  <a:schemeClr val="accent1">
-                    <a:lumMod val="75000"/>
-                  </a:schemeClr>
-                </a:solidFill>
-              </a:rPr>
-              <a:t>	cout &lt;&lt; x &lt;&lt; ' ' &lt;&lt; y &lt;&lt; '\n';</a:t>
+              <a:t>      b = temp;</a:t>
             </a:r>
           </a:p>
           <a:p>
@@ -5533,7 +5550,7 @@
     </p:spTree>
     <p:extLst>
       <p:ext uri="{BB962C8B-B14F-4D97-AF65-F5344CB8AC3E}">
-        <p14:creationId xmlns:p14="http://schemas.microsoft.com/office/powerpoint/2010/main" val="995191618"/>
+        <p14:creationId xmlns:p14="http://schemas.microsoft.com/office/powerpoint/2010/main" val="2796991752"/>
       </p:ext>
     </p:extLst>
   </p:cSld>
@@ -6257,6 +6274,234 @@
         </p:nvSpPr>
         <p:spPr>
           <a:xfrm>
+            <a:off x="2039815" y="182245"/>
+            <a:ext cx="9710907" cy="830629"/>
+          </a:xfrm>
+        </p:spPr>
+        <p:txBody>
+          <a:bodyPr>
+            <a:normAutofit/>
+          </a:bodyPr>
+          <a:lstStyle/>
+          <a:p>
+            <a:r>
+              <a:rPr lang="en-CA" dirty="0">
+                <a:solidFill>
+                  <a:schemeClr val="bg1"/>
+                </a:solidFill>
+              </a:rPr>
+              <a:t>Function Template</a:t>
+            </a:r>
+          </a:p>
+        </p:txBody>
+      </p:sp>
+      <p:sp>
+        <p:nvSpPr>
+          <p:cNvPr id="3" name="Content Placeholder 2"/>
+          <p:cNvSpPr>
+            <a:spLocks noGrp="1"/>
+          </p:cNvSpPr>
+          <p:nvPr>
+            <p:ph idx="1"/>
+          </p:nvPr>
+        </p:nvSpPr>
+        <p:spPr>
+          <a:xfrm>
+            <a:off x="838200" y="1508943"/>
+            <a:ext cx="10515600" cy="2721863"/>
+          </a:xfrm>
+        </p:spPr>
+        <p:txBody>
+          <a:bodyPr/>
+          <a:lstStyle/>
+          <a:p>
+            <a:r>
+              <a:rPr lang="en-CA" dirty="0"/>
+              <a:t> When the compiler creates a specific version of this function, it is said to have created a specialization. </a:t>
+            </a:r>
+          </a:p>
+          <a:p>
+            <a:r>
+              <a:rPr lang="en-CA" dirty="0"/>
+              <a:t>This is also called a generated function. The act of generating a function is referred to as instantiating it.</a:t>
+            </a:r>
+          </a:p>
+          <a:p>
+            <a:r>
+              <a:rPr lang="en-CA" dirty="0"/>
+              <a:t>You can define more than one generic data type in the template statement by using a comma-separated list.</a:t>
+            </a:r>
+          </a:p>
+          <a:p>
+            <a:endParaRPr lang="en-CA" dirty="0"/>
+          </a:p>
+        </p:txBody>
+      </p:sp>
+      <p:sp>
+        <p:nvSpPr>
+          <p:cNvPr id="4" name="TextBox 3"/>
+          <p:cNvSpPr txBox="1"/>
+          <p:nvPr/>
+        </p:nvSpPr>
+        <p:spPr>
+          <a:xfrm>
+            <a:off x="1093863" y="4441116"/>
+            <a:ext cx="10716978" cy="2246769"/>
+          </a:xfrm>
+          <a:prstGeom prst="rect">
+            <a:avLst/>
+          </a:prstGeom>
+          <a:noFill/>
+        </p:spPr>
+        <p:txBody>
+          <a:bodyPr wrap="square" rtlCol="0">
+            <a:spAutoFit/>
+          </a:bodyPr>
+          <a:lstStyle/>
+          <a:p>
+            <a:r>
+              <a:rPr lang="en-CA" sz="2800" dirty="0">
+                <a:solidFill>
+                  <a:schemeClr val="accent1">
+                    <a:lumMod val="75000"/>
+                  </a:schemeClr>
+                </a:solidFill>
+              </a:rPr>
+              <a:t>template &lt;</a:t>
+            </a:r>
+            <a:r>
+              <a:rPr lang="en-CA" sz="2800" dirty="0" err="1">
+                <a:solidFill>
+                  <a:schemeClr val="accent1">
+                    <a:lumMod val="75000"/>
+                  </a:schemeClr>
+                </a:solidFill>
+              </a:rPr>
+              <a:t>typename</a:t>
+            </a:r>
+            <a:r>
+              <a:rPr lang="en-CA" sz="2800" dirty="0">
+                <a:solidFill>
+                  <a:schemeClr val="accent1">
+                    <a:lumMod val="75000"/>
+                  </a:schemeClr>
+                </a:solidFill>
+              </a:rPr>
+              <a:t> T, </a:t>
+            </a:r>
+            <a:r>
+              <a:rPr lang="en-CA" sz="2800" dirty="0" err="1">
+                <a:solidFill>
+                  <a:schemeClr val="accent1">
+                    <a:lumMod val="75000"/>
+                  </a:schemeClr>
+                </a:solidFill>
+              </a:rPr>
+              <a:t>typename</a:t>
+            </a:r>
+            <a:r>
+              <a:rPr lang="en-CA" sz="2800" dirty="0">
+                <a:solidFill>
+                  <a:schemeClr val="accent1">
+                    <a:lumMod val="75000"/>
+                  </a:schemeClr>
+                </a:solidFill>
+              </a:rPr>
+              <a:t> U&gt;</a:t>
+            </a:r>
+          </a:p>
+          <a:p>
+            <a:r>
+              <a:rPr lang="en-CA" sz="2800" dirty="0">
+                <a:solidFill>
+                  <a:schemeClr val="accent1">
+                    <a:lumMod val="75000"/>
+                  </a:schemeClr>
+                </a:solidFill>
+              </a:rPr>
+              <a:t>void print(T&amp; x, U&amp; y)</a:t>
+            </a:r>
+          </a:p>
+          <a:p>
+            <a:r>
+              <a:rPr lang="en-CA" sz="2800" dirty="0">
+                <a:solidFill>
+                  <a:schemeClr val="accent1">
+                    <a:lumMod val="75000"/>
+                  </a:schemeClr>
+                </a:solidFill>
+              </a:rPr>
+              <a:t>{</a:t>
+            </a:r>
+          </a:p>
+          <a:p>
+            <a:r>
+              <a:rPr lang="en-CA" sz="2800" dirty="0">
+                <a:solidFill>
+                  <a:schemeClr val="accent1">
+                    <a:lumMod val="75000"/>
+                  </a:schemeClr>
+                </a:solidFill>
+              </a:rPr>
+              <a:t>	cout &lt;&lt; x &lt;&lt; ' ' &lt;&lt; y &lt;&lt; '\n';</a:t>
+            </a:r>
+          </a:p>
+          <a:p>
+            <a:r>
+              <a:rPr lang="en-CA" sz="2800" dirty="0">
+                <a:solidFill>
+                  <a:schemeClr val="accent1">
+                    <a:lumMod val="75000"/>
+                  </a:schemeClr>
+                </a:solidFill>
+              </a:rPr>
+              <a:t>}</a:t>
+            </a:r>
+          </a:p>
+        </p:txBody>
+      </p:sp>
+    </p:spTree>
+    <p:extLst>
+      <p:ext uri="{BB962C8B-B14F-4D97-AF65-F5344CB8AC3E}">
+        <p14:creationId xmlns:p14="http://schemas.microsoft.com/office/powerpoint/2010/main" val="995191618"/>
+      </p:ext>
+    </p:extLst>
+  </p:cSld>
+  <p:clrMapOvr>
+    <a:masterClrMapping/>
+  </p:clrMapOvr>
+</p:sld>
+</file>
+
+<file path=ppt/slides/slide21.xml><?xml version="1.0" encoding="utf-8"?>
+<p:sld xmlns:a="http://schemas.openxmlformats.org/drawingml/2006/main" xmlns:r="http://schemas.openxmlformats.org/officeDocument/2006/relationships" xmlns:p="http://schemas.openxmlformats.org/presentationml/2006/main">
+  <p:cSld>
+    <p:spTree>
+      <p:nvGrpSpPr>
+        <p:cNvPr id="1" name=""/>
+        <p:cNvGrpSpPr/>
+        <p:nvPr/>
+      </p:nvGrpSpPr>
+      <p:grpSpPr>
+        <a:xfrm>
+          <a:off x="0" y="0"/>
+          <a:ext cx="0" cy="0"/>
+          <a:chOff x="0" y="0"/>
+          <a:chExt cx="0" cy="0"/>
+        </a:xfrm>
+      </p:grpSpPr>
+      <p:sp>
+        <p:nvSpPr>
+          <p:cNvPr id="2" name="Title 1"/>
+          <p:cNvSpPr>
+            <a:spLocks noGrp="1"/>
+          </p:cNvSpPr>
+          <p:nvPr>
+            <p:ph type="title"/>
+          </p:nvPr>
+        </p:nvSpPr>
+        <p:spPr>
+          <a:xfrm>
             <a:off x="1966928" y="131861"/>
             <a:ext cx="9710907" cy="830629"/>
           </a:xfrm>
@@ -6702,7 +6947,7 @@
 </p:sld>
 </file>
 
-<file path=ppt/slides/slide21.xml><?xml version="1.0" encoding="utf-8"?>
+<file path=ppt/slides/slide22.xml><?xml version="1.0" encoding="utf-8"?>
 <p:sld xmlns:a="http://schemas.openxmlformats.org/drawingml/2006/main" xmlns:r="http://schemas.openxmlformats.org/officeDocument/2006/relationships" xmlns:p="http://schemas.openxmlformats.org/presentationml/2006/main">
   <p:cSld>
     <p:spTree>
@@ -7173,7 +7418,7 @@
 </p:sld>
 </file>
 
-<file path=ppt/slides/slide22.xml><?xml version="1.0" encoding="utf-8"?>
+<file path=ppt/slides/slide23.xml><?xml version="1.0" encoding="utf-8"?>
 <p:sld xmlns:a="http://schemas.openxmlformats.org/drawingml/2006/main" xmlns:r="http://schemas.openxmlformats.org/officeDocument/2006/relationships" xmlns:p="http://schemas.openxmlformats.org/presentationml/2006/main">
   <p:cSld>
     <p:spTree>

</xml_diff>